<commit_message>
Updated the PLL algorithms
</commit_message>
<xml_diff>
--- a/images/metro-notation.pptx
+++ b/images/metro-notation.pptx
@@ -106,7 +106,57 @@
       </a:defRPr>
     </a:lvl9pPr>
   </p:defaultTextStyle>
+  <p:extLst>
+    <p:ext uri="{EFAFB233-063F-42B5-8137-9DF3F51BA10A}">
+      <p15:sldGuideLst xmlns:p15="http://schemas.microsoft.com/office/powerpoint/2012/main"/>
+    </p:ext>
+  </p:extLst>
 </p:presentation>
+</file>
+
+<file path=ppt/revisionInfo.xml><?xml version="1.0" encoding="utf-8"?>
+<p1510:revInfo xmlns:a="http://schemas.openxmlformats.org/drawingml/2006/main" xmlns:r="http://schemas.openxmlformats.org/officeDocument/2006/relationships" xmlns:p1510="http://schemas.microsoft.com/office/powerpoint/2015/10/main">
+  <p1510:revLst>
+    <p1510:client id="{7826EAF9-8AFB-024E-A50A-A86D580F7DB8}" v="1" dt="2021-01-16T09:25:59.528"/>
+  </p1510:revLst>
+</p1510:revInfo>
+</file>
+
+<file path=ppt/changesInfos/changesInfo1.xml><?xml version="1.0" encoding="utf-8"?>
+<pc:chgInfo xmlns:a="http://schemas.openxmlformats.org/drawingml/2006/main" xmlns:r="http://schemas.openxmlformats.org/officeDocument/2006/relationships" xmlns:ac="http://schemas.microsoft.com/office/drawing/2013/main/command" xmlns:pc="http://schemas.microsoft.com/office/powerpoint/2013/main/command">
+  <pc:docChgLst>
+    <pc:chgData name="Kitao Takashi" userId="1be10e3e9cd78611" providerId="LiveId" clId="{7826EAF9-8AFB-024E-A50A-A86D580F7DB8}"/>
+    <pc:docChg chg="custSel modSld">
+      <pc:chgData name="Kitao Takashi" userId="1be10e3e9cd78611" providerId="LiveId" clId="{7826EAF9-8AFB-024E-A50A-A86D580F7DB8}" dt="2021-01-16T09:27:35.900" v="14" actId="12788"/>
+      <pc:docMkLst>
+        <pc:docMk/>
+      </pc:docMkLst>
+      <pc:sldChg chg="addSp delSp modSp mod">
+        <pc:chgData name="Kitao Takashi" userId="1be10e3e9cd78611" providerId="LiveId" clId="{7826EAF9-8AFB-024E-A50A-A86D580F7DB8}" dt="2021-01-16T09:27:35.900" v="14" actId="12788"/>
+        <pc:sldMkLst>
+          <pc:docMk/>
+          <pc:sldMk cId="2983693793" sldId="256"/>
+        </pc:sldMkLst>
+        <pc:picChg chg="add mod">
+          <ac:chgData name="Kitao Takashi" userId="1be10e3e9cd78611" providerId="LiveId" clId="{7826EAF9-8AFB-024E-A50A-A86D580F7DB8}" dt="2021-01-16T09:27:35.900" v="14" actId="12788"/>
+          <ac:picMkLst>
+            <pc:docMk/>
+            <pc:sldMk cId="2983693793" sldId="256"/>
+            <ac:picMk id="3" creationId="{35457E09-778D-D54E-8FC2-5ACBA8FAAD26}"/>
+          </ac:picMkLst>
+        </pc:picChg>
+        <pc:picChg chg="del mod">
+          <ac:chgData name="Kitao Takashi" userId="1be10e3e9cd78611" providerId="LiveId" clId="{7826EAF9-8AFB-024E-A50A-A86D580F7DB8}" dt="2021-01-16T09:27:31.810" v="13" actId="478"/>
+          <ac:picMkLst>
+            <pc:docMk/>
+            <pc:sldMk cId="2983693793" sldId="256"/>
+            <ac:picMk id="9" creationId="{DB86A0D7-18A5-374E-B80C-76E0E04209E9}"/>
+          </ac:picMkLst>
+        </pc:picChg>
+      </pc:sldChg>
+    </pc:docChg>
+  </pc:docChgLst>
+</pc:chgInfo>
 </file>
 
 <file path=ppt/slideLayouts/slideLayout1.xml><?xml version="1.0" encoding="utf-8"?>
@@ -240,7 +290,7 @@
           <a:p>
             <a:fld id="{E0CDB528-F972-7442-8ECC-3FA6D5A5F4E9}" type="datetimeFigureOut">
               <a:rPr kumimoji="1" lang="ja-JP" altLang="en-US" smtClean="0"/>
-              <a:t>2020/12/24</a:t>
+              <a:t>2021/1/16</a:t>
             </a:fld>
             <a:endParaRPr kumimoji="1" lang="ja-JP" altLang="en-US"/>
           </a:p>
@@ -442,7 +492,7 @@
           <a:p>
             <a:fld id="{E0CDB528-F972-7442-8ECC-3FA6D5A5F4E9}" type="datetimeFigureOut">
               <a:rPr kumimoji="1" lang="ja-JP" altLang="en-US" smtClean="0"/>
-              <a:t>2020/12/24</a:t>
+              <a:t>2021/1/16</a:t>
             </a:fld>
             <a:endParaRPr kumimoji="1" lang="ja-JP" altLang="en-US"/>
           </a:p>
@@ -654,7 +704,7 @@
           <a:p>
             <a:fld id="{E0CDB528-F972-7442-8ECC-3FA6D5A5F4E9}" type="datetimeFigureOut">
               <a:rPr kumimoji="1" lang="ja-JP" altLang="en-US" smtClean="0"/>
-              <a:t>2020/12/24</a:t>
+              <a:t>2021/1/16</a:t>
             </a:fld>
             <a:endParaRPr kumimoji="1" lang="ja-JP" altLang="en-US"/>
           </a:p>
@@ -856,7 +906,7 @@
           <a:p>
             <a:fld id="{E0CDB528-F972-7442-8ECC-3FA6D5A5F4E9}" type="datetimeFigureOut">
               <a:rPr kumimoji="1" lang="ja-JP" altLang="en-US" smtClean="0"/>
-              <a:t>2020/12/24</a:t>
+              <a:t>2021/1/16</a:t>
             </a:fld>
             <a:endParaRPr kumimoji="1" lang="ja-JP" altLang="en-US"/>
           </a:p>
@@ -1100,7 +1150,7 @@
           <a:p>
             <a:fld id="{E0CDB528-F972-7442-8ECC-3FA6D5A5F4E9}" type="datetimeFigureOut">
               <a:rPr kumimoji="1" lang="ja-JP" altLang="en-US" smtClean="0"/>
-              <a:t>2020/12/24</a:t>
+              <a:t>2021/1/16</a:t>
             </a:fld>
             <a:endParaRPr kumimoji="1" lang="ja-JP" altLang="en-US"/>
           </a:p>
@@ -1396,7 +1446,7 @@
           <a:p>
             <a:fld id="{E0CDB528-F972-7442-8ECC-3FA6D5A5F4E9}" type="datetimeFigureOut">
               <a:rPr kumimoji="1" lang="ja-JP" altLang="en-US" smtClean="0"/>
-              <a:t>2020/12/24</a:t>
+              <a:t>2021/1/16</a:t>
             </a:fld>
             <a:endParaRPr kumimoji="1" lang="ja-JP" altLang="en-US"/>
           </a:p>
@@ -1827,7 +1877,7 @@
           <a:p>
             <a:fld id="{E0CDB528-F972-7442-8ECC-3FA6D5A5F4E9}" type="datetimeFigureOut">
               <a:rPr kumimoji="1" lang="ja-JP" altLang="en-US" smtClean="0"/>
-              <a:t>2020/12/24</a:t>
+              <a:t>2021/1/16</a:t>
             </a:fld>
             <a:endParaRPr kumimoji="1" lang="ja-JP" altLang="en-US"/>
           </a:p>
@@ -1945,7 +1995,7 @@
           <a:p>
             <a:fld id="{E0CDB528-F972-7442-8ECC-3FA6D5A5F4E9}" type="datetimeFigureOut">
               <a:rPr kumimoji="1" lang="ja-JP" altLang="en-US" smtClean="0"/>
-              <a:t>2020/12/24</a:t>
+              <a:t>2021/1/16</a:t>
             </a:fld>
             <a:endParaRPr kumimoji="1" lang="ja-JP" altLang="en-US"/>
           </a:p>
@@ -2040,7 +2090,7 @@
           <a:p>
             <a:fld id="{E0CDB528-F972-7442-8ECC-3FA6D5A5F4E9}" type="datetimeFigureOut">
               <a:rPr kumimoji="1" lang="ja-JP" altLang="en-US" smtClean="0"/>
-              <a:t>2020/12/24</a:t>
+              <a:t>2021/1/16</a:t>
             </a:fld>
             <a:endParaRPr kumimoji="1" lang="ja-JP" altLang="en-US"/>
           </a:p>
@@ -2349,7 +2399,7 @@
           <a:p>
             <a:fld id="{E0CDB528-F972-7442-8ECC-3FA6D5A5F4E9}" type="datetimeFigureOut">
               <a:rPr kumimoji="1" lang="ja-JP" altLang="en-US" smtClean="0"/>
-              <a:t>2020/12/24</a:t>
+              <a:t>2021/1/16</a:t>
             </a:fld>
             <a:endParaRPr kumimoji="1" lang="ja-JP" altLang="en-US"/>
           </a:p>
@@ -2606,7 +2656,7 @@
           <a:p>
             <a:fld id="{E0CDB528-F972-7442-8ECC-3FA6D5A5F4E9}" type="datetimeFigureOut">
               <a:rPr kumimoji="1" lang="ja-JP" altLang="en-US" smtClean="0"/>
-              <a:t>2020/12/24</a:t>
+              <a:t>2021/1/16</a:t>
             </a:fld>
             <a:endParaRPr kumimoji="1" lang="ja-JP" altLang="en-US"/>
           </a:p>
@@ -2851,7 +2901,7 @@
           <a:p>
             <a:fld id="{E0CDB528-F972-7442-8ECC-3FA6D5A5F4E9}" type="datetimeFigureOut">
               <a:rPr kumimoji="1" lang="ja-JP" altLang="en-US" smtClean="0"/>
-              <a:t>2020/12/24</a:t>
+              <a:t>2021/1/16</a:t>
             </a:fld>
             <a:endParaRPr kumimoji="1" lang="ja-JP" altLang="en-US"/>
           </a:p>
@@ -3256,12 +3306,48 @@
           <a:chExt cx="0" cy="0"/>
         </a:xfrm>
       </p:grpSpPr>
+      <p:sp>
+        <p:nvSpPr>
+          <p:cNvPr id="10" name="テキスト ボックス 9">
+            <a:extLst>
+              <a:ext uri="{FF2B5EF4-FFF2-40B4-BE49-F238E27FC236}">
+                <a16:creationId xmlns:a16="http://schemas.microsoft.com/office/drawing/2014/main" id="{E6D4C2FF-1EA8-5E4D-8091-0FF32DF65099}"/>
+              </a:ext>
+            </a:extLst>
+          </p:cNvPr>
+          <p:cNvSpPr txBox="1"/>
+          <p:nvPr/>
+        </p:nvSpPr>
+        <p:spPr>
+          <a:xfrm>
+            <a:off x="92600" y="92600"/>
+            <a:ext cx="2273764" cy="276999"/>
+          </a:xfrm>
+          <a:prstGeom prst="rect">
+            <a:avLst/>
+          </a:prstGeom>
+          <a:noFill/>
+        </p:spPr>
+        <p:txBody>
+          <a:bodyPr wrap="none" rtlCol="0">
+            <a:spAutoFit/>
+          </a:bodyPr>
+          <a:lstStyle/>
+          <a:p>
+            <a:r>
+              <a:rPr kumimoji="1" lang="en-US" altLang="ja-JP" sz="1200" dirty="0"/>
+              <a:t>PLL Algorithms in Metro Notation</a:t>
+            </a:r>
+            <a:endParaRPr kumimoji="1" lang="ja-JP" altLang="en-US" sz="1200"/>
+          </a:p>
+        </p:txBody>
+      </p:sp>
       <p:pic>
         <p:nvPicPr>
-          <p:cNvPr id="9" name="図 8" descr="グラフィカル ユーザー インターフェイス, アプリケーション, Word&#10;&#10;自動的に生成された説明">
+          <p:cNvPr id="3" name="図 2" descr="グラフィカル ユーザー インターフェイス, アプリケーション, Word&#10;&#10;自動的に生成された説明">
             <a:extLst>
               <a:ext uri="{FF2B5EF4-FFF2-40B4-BE49-F238E27FC236}">
-                <a16:creationId xmlns:a16="http://schemas.microsoft.com/office/drawing/2014/main" id="{DB86A0D7-18A5-374E-B80C-76E0E04209E9}"/>
+                <a16:creationId xmlns:a16="http://schemas.microsoft.com/office/drawing/2014/main" id="{35457E09-778D-D54E-8FC2-5ACBA8FAAD26}"/>
               </a:ext>
             </a:extLst>
           </p:cNvPr>
@@ -3278,50 +3364,14 @@
         </p:blipFill>
         <p:spPr>
           <a:xfrm>
-            <a:off x="600647" y="612000"/>
-            <a:ext cx="8704707" cy="5901563"/>
+            <a:off x="699072" y="612000"/>
+            <a:ext cx="8507857" cy="5901563"/>
           </a:xfrm>
           <a:prstGeom prst="rect">
             <a:avLst/>
           </a:prstGeom>
         </p:spPr>
       </p:pic>
-      <p:sp>
-        <p:nvSpPr>
-          <p:cNvPr id="10" name="テキスト ボックス 9">
-            <a:extLst>
-              <a:ext uri="{FF2B5EF4-FFF2-40B4-BE49-F238E27FC236}">
-                <a16:creationId xmlns:a16="http://schemas.microsoft.com/office/drawing/2014/main" id="{E6D4C2FF-1EA8-5E4D-8091-0FF32DF65099}"/>
-              </a:ext>
-            </a:extLst>
-          </p:cNvPr>
-          <p:cNvSpPr txBox="1"/>
-          <p:nvPr/>
-        </p:nvSpPr>
-        <p:spPr>
-          <a:xfrm>
-            <a:off x="92600" y="92600"/>
-            <a:ext cx="2273764" cy="276999"/>
-          </a:xfrm>
-          <a:prstGeom prst="rect">
-            <a:avLst/>
-          </a:prstGeom>
-          <a:noFill/>
-        </p:spPr>
-        <p:txBody>
-          <a:bodyPr wrap="none" rtlCol="0">
-            <a:spAutoFit/>
-          </a:bodyPr>
-          <a:lstStyle/>
-          <a:p>
-            <a:r>
-              <a:rPr kumimoji="1" lang="en-US" altLang="ja-JP" sz="1200" dirty="0"/>
-              <a:t>PLL Algorithms in Metro Notation</a:t>
-            </a:r>
-            <a:endParaRPr kumimoji="1" lang="ja-JP" altLang="en-US" sz="1200"/>
-          </a:p>
-        </p:txBody>
-      </p:sp>
     </p:spTree>
     <p:extLst>
       <p:ext uri="{BB962C8B-B14F-4D97-AF65-F5344CB8AC3E}">

</xml_diff>

<commit_message>
Updated the pptx and pdf
</commit_message>
<xml_diff>
--- a/images/metro-notation.pptx
+++ b/images/metro-notation.pptx
@@ -117,7 +117,7 @@
 <file path=ppt/revisionInfo.xml><?xml version="1.0" encoding="utf-8"?>
 <p1510:revInfo xmlns:a="http://schemas.openxmlformats.org/drawingml/2006/main" xmlns:r="http://schemas.openxmlformats.org/officeDocument/2006/relationships" xmlns:p1510="http://schemas.microsoft.com/office/powerpoint/2015/10/main">
   <p1510:revLst>
-    <p1510:client id="{7826EAF9-8AFB-024E-A50A-A86D580F7DB8}" v="1" dt="2021-01-16T09:25:59.528"/>
+    <p1510:client id="{7826EAF9-8AFB-024E-A50A-A86D580F7DB8}" v="2" dt="2021-02-23T14:38:49.899"/>
   </p1510:revLst>
 </p1510:revInfo>
 </file>
@@ -127,7 +127,7 @@
   <pc:docChgLst>
     <pc:chgData name="Kitao Takashi" userId="1be10e3e9cd78611" providerId="LiveId" clId="{7826EAF9-8AFB-024E-A50A-A86D580F7DB8}"/>
     <pc:docChg chg="custSel modSld">
-      <pc:chgData name="Kitao Takashi" userId="1be10e3e9cd78611" providerId="LiveId" clId="{7826EAF9-8AFB-024E-A50A-A86D580F7DB8}" dt="2021-01-16T09:27:35.900" v="14" actId="12788"/>
+      <pc:chgData name="Kitao Takashi" userId="1be10e3e9cd78611" providerId="LiveId" clId="{7826EAF9-8AFB-024E-A50A-A86D580F7DB8}" dt="2021-02-23T14:40:04.742" v="26" actId="12788"/>
       <pc:docMkLst>
         <pc:docMk/>
       </pc:docMkLst>
@@ -154,6 +154,29 @@
           </ac:picMkLst>
         </pc:picChg>
       </pc:sldChg>
+      <pc:sldChg chg="addSp delSp modSp mod">
+        <pc:chgData name="Kitao Takashi" userId="1be10e3e9cd78611" providerId="LiveId" clId="{7826EAF9-8AFB-024E-A50A-A86D580F7DB8}" dt="2021-02-23T14:40:04.742" v="26" actId="12788"/>
+        <pc:sldMkLst>
+          <pc:docMk/>
+          <pc:sldMk cId="3344094706" sldId="258"/>
+        </pc:sldMkLst>
+        <pc:picChg chg="del mod">
+          <ac:chgData name="Kitao Takashi" userId="1be10e3e9cd78611" providerId="LiveId" clId="{7826EAF9-8AFB-024E-A50A-A86D580F7DB8}" dt="2021-02-23T14:40:00.576" v="25" actId="478"/>
+          <ac:picMkLst>
+            <pc:docMk/>
+            <pc:sldMk cId="3344094706" sldId="258"/>
+            <ac:picMk id="2" creationId="{7A993251-E0F7-5B47-BAE1-F0AF7A93B87D}"/>
+          </ac:picMkLst>
+        </pc:picChg>
+        <pc:picChg chg="add mod">
+          <ac:chgData name="Kitao Takashi" userId="1be10e3e9cd78611" providerId="LiveId" clId="{7826EAF9-8AFB-024E-A50A-A86D580F7DB8}" dt="2021-02-23T14:40:04.742" v="26" actId="12788"/>
+          <ac:picMkLst>
+            <pc:docMk/>
+            <pc:sldMk cId="3344094706" sldId="258"/>
+            <ac:picMk id="5" creationId="{F28E2DFF-AA49-5649-A75A-F8D89974D5E7}"/>
+          </ac:picMkLst>
+        </pc:picChg>
+      </pc:sldChg>
     </pc:docChg>
   </pc:docChgLst>
 </pc:chgInfo>
@@ -290,7 +313,7 @@
           <a:p>
             <a:fld id="{E0CDB528-F972-7442-8ECC-3FA6D5A5F4E9}" type="datetimeFigureOut">
               <a:rPr kumimoji="1" lang="ja-JP" altLang="en-US" smtClean="0"/>
-              <a:t>2021/1/16</a:t>
+              <a:t>2021/2/23</a:t>
             </a:fld>
             <a:endParaRPr kumimoji="1" lang="ja-JP" altLang="en-US"/>
           </a:p>
@@ -492,7 +515,7 @@
           <a:p>
             <a:fld id="{E0CDB528-F972-7442-8ECC-3FA6D5A5F4E9}" type="datetimeFigureOut">
               <a:rPr kumimoji="1" lang="ja-JP" altLang="en-US" smtClean="0"/>
-              <a:t>2021/1/16</a:t>
+              <a:t>2021/2/23</a:t>
             </a:fld>
             <a:endParaRPr kumimoji="1" lang="ja-JP" altLang="en-US"/>
           </a:p>
@@ -704,7 +727,7 @@
           <a:p>
             <a:fld id="{E0CDB528-F972-7442-8ECC-3FA6D5A5F4E9}" type="datetimeFigureOut">
               <a:rPr kumimoji="1" lang="ja-JP" altLang="en-US" smtClean="0"/>
-              <a:t>2021/1/16</a:t>
+              <a:t>2021/2/23</a:t>
             </a:fld>
             <a:endParaRPr kumimoji="1" lang="ja-JP" altLang="en-US"/>
           </a:p>
@@ -906,7 +929,7 @@
           <a:p>
             <a:fld id="{E0CDB528-F972-7442-8ECC-3FA6D5A5F4E9}" type="datetimeFigureOut">
               <a:rPr kumimoji="1" lang="ja-JP" altLang="en-US" smtClean="0"/>
-              <a:t>2021/1/16</a:t>
+              <a:t>2021/2/23</a:t>
             </a:fld>
             <a:endParaRPr kumimoji="1" lang="ja-JP" altLang="en-US"/>
           </a:p>
@@ -1150,7 +1173,7 @@
           <a:p>
             <a:fld id="{E0CDB528-F972-7442-8ECC-3FA6D5A5F4E9}" type="datetimeFigureOut">
               <a:rPr kumimoji="1" lang="ja-JP" altLang="en-US" smtClean="0"/>
-              <a:t>2021/1/16</a:t>
+              <a:t>2021/2/23</a:t>
             </a:fld>
             <a:endParaRPr kumimoji="1" lang="ja-JP" altLang="en-US"/>
           </a:p>
@@ -1446,7 +1469,7 @@
           <a:p>
             <a:fld id="{E0CDB528-F972-7442-8ECC-3FA6D5A5F4E9}" type="datetimeFigureOut">
               <a:rPr kumimoji="1" lang="ja-JP" altLang="en-US" smtClean="0"/>
-              <a:t>2021/1/16</a:t>
+              <a:t>2021/2/23</a:t>
             </a:fld>
             <a:endParaRPr kumimoji="1" lang="ja-JP" altLang="en-US"/>
           </a:p>
@@ -1877,7 +1900,7 @@
           <a:p>
             <a:fld id="{E0CDB528-F972-7442-8ECC-3FA6D5A5F4E9}" type="datetimeFigureOut">
               <a:rPr kumimoji="1" lang="ja-JP" altLang="en-US" smtClean="0"/>
-              <a:t>2021/1/16</a:t>
+              <a:t>2021/2/23</a:t>
             </a:fld>
             <a:endParaRPr kumimoji="1" lang="ja-JP" altLang="en-US"/>
           </a:p>
@@ -1995,7 +2018,7 @@
           <a:p>
             <a:fld id="{E0CDB528-F972-7442-8ECC-3FA6D5A5F4E9}" type="datetimeFigureOut">
               <a:rPr kumimoji="1" lang="ja-JP" altLang="en-US" smtClean="0"/>
-              <a:t>2021/1/16</a:t>
+              <a:t>2021/2/23</a:t>
             </a:fld>
             <a:endParaRPr kumimoji="1" lang="ja-JP" altLang="en-US"/>
           </a:p>
@@ -2090,7 +2113,7 @@
           <a:p>
             <a:fld id="{E0CDB528-F972-7442-8ECC-3FA6D5A5F4E9}" type="datetimeFigureOut">
               <a:rPr kumimoji="1" lang="ja-JP" altLang="en-US" smtClean="0"/>
-              <a:t>2021/1/16</a:t>
+              <a:t>2021/2/23</a:t>
             </a:fld>
             <a:endParaRPr kumimoji="1" lang="ja-JP" altLang="en-US"/>
           </a:p>
@@ -2399,7 +2422,7 @@
           <a:p>
             <a:fld id="{E0CDB528-F972-7442-8ECC-3FA6D5A5F4E9}" type="datetimeFigureOut">
               <a:rPr kumimoji="1" lang="ja-JP" altLang="en-US" smtClean="0"/>
-              <a:t>2021/1/16</a:t>
+              <a:t>2021/2/23</a:t>
             </a:fld>
             <a:endParaRPr kumimoji="1" lang="ja-JP" altLang="en-US"/>
           </a:p>
@@ -2656,7 +2679,7 @@
           <a:p>
             <a:fld id="{E0CDB528-F972-7442-8ECC-3FA6D5A5F4E9}" type="datetimeFigureOut">
               <a:rPr kumimoji="1" lang="ja-JP" altLang="en-US" smtClean="0"/>
-              <a:t>2021/1/16</a:t>
+              <a:t>2021/2/23</a:t>
             </a:fld>
             <a:endParaRPr kumimoji="1" lang="ja-JP" altLang="en-US"/>
           </a:p>
@@ -2901,7 +2924,7 @@
           <a:p>
             <a:fld id="{E0CDB528-F972-7442-8ECC-3FA6D5A5F4E9}" type="datetimeFigureOut">
               <a:rPr kumimoji="1" lang="ja-JP" altLang="en-US" smtClean="0"/>
-              <a:t>2021/1/16</a:t>
+              <a:t>2021/2/23</a:t>
             </a:fld>
             <a:endParaRPr kumimoji="1" lang="ja-JP" altLang="en-US"/>
           </a:p>
@@ -3498,12 +3521,48 @@
           <a:chExt cx="0" cy="0"/>
         </a:xfrm>
       </p:grpSpPr>
+      <p:sp>
+        <p:nvSpPr>
+          <p:cNvPr id="3" name="テキスト ボックス 2">
+            <a:extLst>
+              <a:ext uri="{FF2B5EF4-FFF2-40B4-BE49-F238E27FC236}">
+                <a16:creationId xmlns:a16="http://schemas.microsoft.com/office/drawing/2014/main" id="{13D22E48-2F29-9C46-991D-C810F5685D23}"/>
+              </a:ext>
+            </a:extLst>
+          </p:cNvPr>
+          <p:cNvSpPr txBox="1"/>
+          <p:nvPr/>
+        </p:nvSpPr>
+        <p:spPr>
+          <a:xfrm>
+            <a:off x="92600" y="92600"/>
+            <a:ext cx="2640851" cy="276999"/>
+          </a:xfrm>
+          <a:prstGeom prst="rect">
+            <a:avLst/>
+          </a:prstGeom>
+          <a:noFill/>
+        </p:spPr>
+        <p:txBody>
+          <a:bodyPr wrap="none" rtlCol="0">
+            <a:spAutoFit/>
+          </a:bodyPr>
+          <a:lstStyle/>
+          <a:p>
+            <a:r>
+              <a:rPr kumimoji="1" lang="en-US" altLang="ja-JP" sz="1200" dirty="0"/>
+              <a:t>OLL Algorithms in Metro Notation (2/2)</a:t>
+            </a:r>
+            <a:endParaRPr kumimoji="1" lang="ja-JP" altLang="en-US" sz="1200"/>
+          </a:p>
+        </p:txBody>
+      </p:sp>
       <p:pic>
         <p:nvPicPr>
-          <p:cNvPr id="2" name="図 1" descr="グラフィカル ユーザー インターフェイス, アプリケーション, Word&#10;&#10;自動的に生成された説明">
+          <p:cNvPr id="5" name="図 4" descr="グラフィカル ユーザー インターフェイス, アプリケーション, Word&#10;&#10;自動的に生成された説明">
             <a:extLst>
               <a:ext uri="{FF2B5EF4-FFF2-40B4-BE49-F238E27FC236}">
-                <a16:creationId xmlns:a16="http://schemas.microsoft.com/office/drawing/2014/main" id="{7A993251-E0F7-5B47-BAE1-F0AF7A93B87D}"/>
+                <a16:creationId xmlns:a16="http://schemas.microsoft.com/office/drawing/2014/main" id="{F28E2DFF-AA49-5649-A75A-F8D89974D5E7}"/>
               </a:ext>
             </a:extLst>
           </p:cNvPr>
@@ -3528,42 +3587,6 @@
           </a:prstGeom>
         </p:spPr>
       </p:pic>
-      <p:sp>
-        <p:nvSpPr>
-          <p:cNvPr id="3" name="テキスト ボックス 2">
-            <a:extLst>
-              <a:ext uri="{FF2B5EF4-FFF2-40B4-BE49-F238E27FC236}">
-                <a16:creationId xmlns:a16="http://schemas.microsoft.com/office/drawing/2014/main" id="{13D22E48-2F29-9C46-991D-C810F5685D23}"/>
-              </a:ext>
-            </a:extLst>
-          </p:cNvPr>
-          <p:cNvSpPr txBox="1"/>
-          <p:nvPr/>
-        </p:nvSpPr>
-        <p:spPr>
-          <a:xfrm>
-            <a:off x="92600" y="92600"/>
-            <a:ext cx="2640851" cy="276999"/>
-          </a:xfrm>
-          <a:prstGeom prst="rect">
-            <a:avLst/>
-          </a:prstGeom>
-          <a:noFill/>
-        </p:spPr>
-        <p:txBody>
-          <a:bodyPr wrap="none" rtlCol="0">
-            <a:spAutoFit/>
-          </a:bodyPr>
-          <a:lstStyle/>
-          <a:p>
-            <a:r>
-              <a:rPr kumimoji="1" lang="en-US" altLang="ja-JP" sz="1200" dirty="0"/>
-              <a:t>OLL Algorithms in Metro Notation (2/2)</a:t>
-            </a:r>
-            <a:endParaRPr kumimoji="1" lang="ja-JP" altLang="en-US" sz="1200"/>
-          </a:p>
-        </p:txBody>
-      </p:sp>
     </p:spTree>
     <p:extLst>
       <p:ext uri="{BB962C8B-B14F-4D97-AF65-F5344CB8AC3E}">

</xml_diff>